<commit_message>
Include CGAL (not yet working)
</commit_message>
<xml_diff>
--- a/Texts_and_Screenshots/Praesentation/Präsentation1.pptx
+++ b/Texts_and_Screenshots/Praesentation/Präsentation1.pptx
@@ -5,13 +5,14 @@
     <p:sldMasterId id="2147483648" r:id="rId1"/>
   </p:sldMasterIdLst>
   <p:handoutMasterIdLst>
-    <p:handoutMasterId r:id="rId6"/>
+    <p:handoutMasterId r:id="rId7"/>
   </p:handoutMasterIdLst>
   <p:sldIdLst>
     <p:sldId id="263" r:id="rId2"/>
     <p:sldId id="259" r:id="rId3"/>
     <p:sldId id="261" r:id="rId4"/>
     <p:sldId id="262" r:id="rId5"/>
+    <p:sldId id="264" r:id="rId6"/>
   </p:sldIdLst>
   <p:sldSz cx="9144000" cy="5143500" type="screen16x9"/>
   <p:notesSz cx="6858000" cy="9144000"/>
@@ -195,7 +196,7 @@
           <a:p>
             <a:fld id="{E1E5D030-BBE0-4BCE-8DDD-CE4766596DF4}" type="datetimeFigureOut">
               <a:rPr lang="en-US" smtClean="0"/>
-              <a:t>1/17/2015</a:t>
+              <a:t>1/18/2015</a:t>
             </a:fld>
             <a:endParaRPr lang="en-US"/>
           </a:p>
@@ -317,13 +318,13 @@
         </p:spPr>
         <p:style>
           <a:lnRef idx="1">
-            <a:schemeClr val="accent2"/>
+            <a:schemeClr val="accent1"/>
           </a:lnRef>
           <a:fillRef idx="0">
-            <a:schemeClr val="accent2"/>
+            <a:schemeClr val="accent1"/>
           </a:fillRef>
           <a:effectRef idx="0">
-            <a:schemeClr val="accent2"/>
+            <a:schemeClr val="accent1"/>
           </a:effectRef>
           <a:fontRef idx="minor">
             <a:schemeClr val="tx1"/>
@@ -347,13 +348,13 @@
         </p:spPr>
         <p:style>
           <a:lnRef idx="1">
-            <a:schemeClr val="accent2"/>
+            <a:schemeClr val="accent1"/>
           </a:lnRef>
           <a:fillRef idx="0">
-            <a:schemeClr val="accent2"/>
+            <a:schemeClr val="accent1"/>
           </a:fillRef>
           <a:effectRef idx="0">
-            <a:schemeClr val="accent2"/>
+            <a:schemeClr val="accent1"/>
           </a:effectRef>
           <a:fontRef idx="minor">
             <a:schemeClr val="tx1"/>
@@ -513,7 +514,7 @@
           <a:p>
             <a:fld id="{A76420F5-1C33-4324-B80C-FE21853AB9E1}" type="datetimeFigureOut">
               <a:rPr lang="de-DE" smtClean="0"/>
-              <a:t>17.01.2015</a:t>
+              <a:t>18.01.2015</a:t>
             </a:fld>
             <a:endParaRPr lang="de-DE"/>
           </a:p>
@@ -723,7 +724,7 @@
           <a:p>
             <a:fld id="{A76420F5-1C33-4324-B80C-FE21853AB9E1}" type="datetimeFigureOut">
               <a:rPr lang="de-DE" smtClean="0"/>
-              <a:t>17.01.2015</a:t>
+              <a:t>18.01.2015</a:t>
             </a:fld>
             <a:endParaRPr lang="de-DE"/>
           </a:p>
@@ -1002,7 +1003,7 @@
           <a:p>
             <a:fld id="{A76420F5-1C33-4324-B80C-FE21853AB9E1}" type="datetimeFigureOut">
               <a:rPr lang="de-DE" smtClean="0"/>
-              <a:t>17.01.2015</a:t>
+              <a:t>18.01.2015</a:t>
             </a:fld>
             <a:endParaRPr lang="de-DE"/>
           </a:p>
@@ -1285,7 +1286,7 @@
           <a:p>
             <a:fld id="{A76420F5-1C33-4324-B80C-FE21853AB9E1}" type="datetimeFigureOut">
               <a:rPr lang="de-DE" smtClean="0"/>
-              <a:t>17.01.2015</a:t>
+              <a:t>18.01.2015</a:t>
             </a:fld>
             <a:endParaRPr lang="de-DE"/>
           </a:p>
@@ -1618,7 +1619,7 @@
           <a:p>
             <a:fld id="{A76420F5-1C33-4324-B80C-FE21853AB9E1}" type="datetimeFigureOut">
               <a:rPr lang="de-DE" smtClean="0"/>
-              <a:t>17.01.2015</a:t>
+              <a:t>18.01.2015</a:t>
             </a:fld>
             <a:endParaRPr lang="de-DE"/>
           </a:p>
@@ -2091,7 +2092,7 @@
           <a:p>
             <a:fld id="{A76420F5-1C33-4324-B80C-FE21853AB9E1}" type="datetimeFigureOut">
               <a:rPr lang="de-DE" smtClean="0"/>
-              <a:t>17.01.2015</a:t>
+              <a:t>18.01.2015</a:t>
             </a:fld>
             <a:endParaRPr lang="de-DE"/>
           </a:p>
@@ -2248,7 +2249,7 @@
           <a:p>
             <a:fld id="{A76420F5-1C33-4324-B80C-FE21853AB9E1}" type="datetimeFigureOut">
               <a:rPr lang="de-DE" smtClean="0"/>
-              <a:t>17.01.2015</a:t>
+              <a:t>18.01.2015</a:t>
             </a:fld>
             <a:endParaRPr lang="de-DE"/>
           </a:p>
@@ -2374,7 +2375,7 @@
           <a:p>
             <a:fld id="{A76420F5-1C33-4324-B80C-FE21853AB9E1}" type="datetimeFigureOut">
               <a:rPr lang="de-DE" smtClean="0"/>
-              <a:t>17.01.2015</a:t>
+              <a:t>18.01.2015</a:t>
             </a:fld>
             <a:endParaRPr lang="de-DE"/>
           </a:p>
@@ -2691,7 +2692,7 @@
           <a:p>
             <a:fld id="{A76420F5-1C33-4324-B80C-FE21853AB9E1}" type="datetimeFigureOut">
               <a:rPr lang="de-DE" smtClean="0"/>
-              <a:t>17.01.2015</a:t>
+              <a:t>18.01.2015</a:t>
             </a:fld>
             <a:endParaRPr lang="de-DE"/>
           </a:p>
@@ -2977,7 +2978,7 @@
           <a:p>
             <a:fld id="{A76420F5-1C33-4324-B80C-FE21853AB9E1}" type="datetimeFigureOut">
               <a:rPr lang="de-DE" smtClean="0"/>
-              <a:t>17.01.2015</a:t>
+              <a:t>18.01.2015</a:t>
             </a:fld>
             <a:endParaRPr lang="de-DE"/>
           </a:p>
@@ -3078,7 +3079,7 @@
       </p:grpSpPr>
       <p:cxnSp>
         <p:nvCxnSpPr>
-          <p:cNvPr id="7" name="Gerade Verbindung 6"/>
+          <p:cNvPr id="4" name="Gerade Verbindung 3"/>
           <p:cNvCxnSpPr/>
           <p:nvPr userDrawn="1"/>
         </p:nvCxnSpPr>
@@ -3093,13 +3094,13 @@
         </p:spPr>
         <p:style>
           <a:lnRef idx="1">
-            <a:schemeClr val="accent1"/>
+            <a:schemeClr val="accent2"/>
           </a:lnRef>
           <a:fillRef idx="0">
-            <a:schemeClr val="accent1"/>
+            <a:schemeClr val="accent2"/>
           </a:fillRef>
           <a:effectRef idx="0">
-            <a:schemeClr val="accent1"/>
+            <a:schemeClr val="accent2"/>
           </a:effectRef>
           <a:fontRef idx="minor">
             <a:schemeClr val="tx1"/>
@@ -3108,7 +3109,7 @@
       </p:cxnSp>
       <p:cxnSp>
         <p:nvCxnSpPr>
-          <p:cNvPr id="8" name="Gerade Verbindung 7"/>
+          <p:cNvPr id="5" name="Gerade Verbindung 4"/>
           <p:cNvCxnSpPr/>
           <p:nvPr userDrawn="1"/>
         </p:nvCxnSpPr>
@@ -3123,13 +3124,13 @@
         </p:spPr>
         <p:style>
           <a:lnRef idx="1">
-            <a:schemeClr val="accent1"/>
+            <a:schemeClr val="accent2"/>
           </a:lnRef>
           <a:fillRef idx="0">
-            <a:schemeClr val="accent1"/>
+            <a:schemeClr val="accent2"/>
           </a:fillRef>
           <a:effectRef idx="0">
-            <a:schemeClr val="accent1"/>
+            <a:schemeClr val="accent2"/>
           </a:effectRef>
           <a:fontRef idx="minor">
             <a:schemeClr val="tx1"/>
@@ -3444,6 +3445,18 @@
   <p:clrMapOvr>
     <a:masterClrMapping/>
   </p:clrMapOvr>
+  <mc:AlternateContent xmlns:mc="http://schemas.openxmlformats.org/markup-compatibility/2006">
+    <mc:Choice xmlns:p14="http://schemas.microsoft.com/office/powerpoint/2010/main" Requires="p14">
+      <p:transition spd="med" p14:dur="700">
+        <p:fade/>
+      </p:transition>
+    </mc:Choice>
+    <mc:Fallback>
+      <p:transition spd="med">
+        <p:fade/>
+      </p:transition>
+    </mc:Fallback>
+  </mc:AlternateContent>
   <p:timing>
     <p:tnLst>
       <p:par>
@@ -3527,6 +3540,18 @@
   <p:clrMapOvr>
     <a:masterClrMapping/>
   </p:clrMapOvr>
+  <mc:AlternateContent xmlns:mc="http://schemas.openxmlformats.org/markup-compatibility/2006">
+    <mc:Choice xmlns:p14="http://schemas.microsoft.com/office/powerpoint/2010/main" Requires="p14">
+      <p:transition spd="med" p14:dur="700">
+        <p:fade/>
+      </p:transition>
+    </mc:Choice>
+    <mc:Fallback>
+      <p:transition spd="med">
+        <p:fade/>
+      </p:transition>
+    </mc:Fallback>
+  </mc:AlternateContent>
   <p:timing>
     <p:tnLst>
       <p:par>
@@ -3808,6 +3833,18 @@
   <p:clrMapOvr>
     <a:masterClrMapping/>
   </p:clrMapOvr>
+  <mc:AlternateContent xmlns:mc="http://schemas.openxmlformats.org/markup-compatibility/2006">
+    <mc:Choice xmlns:p14="http://schemas.microsoft.com/office/powerpoint/2010/main" Requires="p14">
+      <p:transition spd="med" p14:dur="700">
+        <p:fade/>
+      </p:transition>
+    </mc:Choice>
+    <mc:Fallback>
+      <p:transition spd="med">
+        <p:fade/>
+      </p:transition>
+    </mc:Fallback>
+  </mc:AlternateContent>
   <p:timing>
     <p:tnLst>
       <p:par>
@@ -4173,6 +4210,18 @@
   <p:clrMapOvr>
     <a:masterClrMapping/>
   </p:clrMapOvr>
+  <mc:AlternateContent xmlns:mc="http://schemas.openxmlformats.org/markup-compatibility/2006">
+    <mc:Choice xmlns:p14="http://schemas.microsoft.com/office/powerpoint/2010/main" Requires="p14">
+      <p:transition spd="med" p14:dur="700">
+        <p:fade/>
+      </p:transition>
+    </mc:Choice>
+    <mc:Fallback>
+      <p:transition spd="med">
+        <p:fade/>
+      </p:transition>
+    </mc:Fallback>
+  </mc:AlternateContent>
   <p:timing>
     <p:tnLst>
       <p:par>
@@ -4261,6 +4310,188 @@
             </p:seq>
           </p:childTnLst>
         </p:cTn>
+      </p:par>
+    </p:tnLst>
+  </p:timing>
+</p:sld>
+</file>
+
+<file path=ppt/slides/slide5.xml><?xml version="1.0" encoding="utf-8"?>
+<p:sld xmlns:a="http://schemas.openxmlformats.org/drawingml/2006/main" xmlns:r="http://schemas.openxmlformats.org/officeDocument/2006/relationships" xmlns:p="http://schemas.openxmlformats.org/presentationml/2006/main">
+  <p:cSld>
+    <p:spTree>
+      <p:nvGrpSpPr>
+        <p:cNvPr id="1" name=""/>
+        <p:cNvGrpSpPr/>
+        <p:nvPr/>
+      </p:nvGrpSpPr>
+      <p:grpSpPr>
+        <a:xfrm>
+          <a:off x="0" y="0"/>
+          <a:ext cx="0" cy="0"/>
+          <a:chOff x="0" y="0"/>
+          <a:chExt cx="0" cy="0"/>
+        </a:xfrm>
+      </p:grpSpPr>
+      <p:sp>
+        <p:nvSpPr>
+          <p:cNvPr id="4" name="Textfeld 3"/>
+          <p:cNvSpPr txBox="1"/>
+          <p:nvPr/>
+        </p:nvSpPr>
+        <p:spPr>
+          <a:xfrm>
+            <a:off x="-1840" y="401724"/>
+            <a:ext cx="4752528" cy="369332"/>
+          </a:xfrm>
+          <a:prstGeom prst="rect">
+            <a:avLst/>
+          </a:prstGeom>
+          <a:noFill/>
+        </p:spPr>
+        <p:txBody>
+          <a:bodyPr wrap="square" rtlCol="0">
+            <a:spAutoFit/>
+          </a:bodyPr>
+          <a:lstStyle/>
+          <a:p>
+            <a:r>
+              <a:rPr lang="de-DE" b="1" dirty="0" smtClean="0">
+                <a:solidFill>
+                  <a:schemeClr val="bg1">
+                    <a:lumMod val="50000"/>
+                  </a:schemeClr>
+                </a:solidFill>
+              </a:rPr>
+              <a:t>Problem: </a:t>
+            </a:r>
+            <a:r>
+              <a:rPr lang="de-DE" dirty="0" smtClean="0">
+                <a:solidFill>
+                  <a:schemeClr val="bg1">
+                    <a:lumMod val="50000"/>
+                  </a:schemeClr>
+                </a:solidFill>
+              </a:rPr>
+              <a:t>Strange </a:t>
+            </a:r>
+            <a:r>
+              <a:rPr lang="de-DE" dirty="0" err="1" smtClean="0">
+                <a:solidFill>
+                  <a:schemeClr val="bg1">
+                    <a:lumMod val="50000"/>
+                  </a:schemeClr>
+                </a:solidFill>
+              </a:rPr>
+              <a:t>Behaviour</a:t>
+            </a:r>
+            <a:endParaRPr lang="de-DE" dirty="0">
+              <a:solidFill>
+                <a:schemeClr val="bg1">
+                  <a:lumMod val="50000"/>
+                </a:schemeClr>
+              </a:solidFill>
+            </a:endParaRPr>
+          </a:p>
+        </p:txBody>
+      </p:sp>
+      <p:sp>
+        <p:nvSpPr>
+          <p:cNvPr id="5" name="Textfeld 4"/>
+          <p:cNvSpPr txBox="1"/>
+          <p:nvPr/>
+        </p:nvSpPr>
+        <p:spPr>
+          <a:xfrm>
+            <a:off x="395536" y="1059582"/>
+            <a:ext cx="7848872" cy="1200329"/>
+          </a:xfrm>
+          <a:prstGeom prst="rect">
+            <a:avLst/>
+          </a:prstGeom>
+          <a:noFill/>
+        </p:spPr>
+        <p:txBody>
+          <a:bodyPr wrap="square" rtlCol="0">
+            <a:spAutoFit/>
+          </a:bodyPr>
+          <a:lstStyle/>
+          <a:p>
+            <a:r>
+              <a:rPr lang="de-DE" b="1" dirty="0" smtClean="0"/>
+              <a:t>PCL/VTK </a:t>
+            </a:r>
+            <a:r>
+              <a:rPr lang="de-DE" b="1" dirty="0" err="1" smtClean="0"/>
+              <a:t>vs</a:t>
+            </a:r>
+            <a:r>
+              <a:rPr lang="de-DE" b="1" dirty="0" smtClean="0"/>
+              <a:t> CGAL</a:t>
+            </a:r>
+          </a:p>
+          <a:p>
+            <a:pPr marL="742950" lvl="1" indent="-285750">
+              <a:buFont typeface="Arial" panose="020B0604020202020204" pitchFamily="34" charset="0"/>
+              <a:buChar char="•"/>
+            </a:pPr>
+            <a:endParaRPr lang="de-DE" b="1" dirty="0" smtClean="0"/>
+          </a:p>
+          <a:p>
+            <a:pPr marL="742950" lvl="1" indent="-285750">
+              <a:buFont typeface="Arial" panose="020B0604020202020204" pitchFamily="34" charset="0"/>
+              <a:buChar char="•"/>
+            </a:pPr>
+            <a:r>
+              <a:rPr lang="de-DE" b="1" dirty="0" smtClean="0"/>
+              <a:t>PCL 1.6.0 CGAL 4.5 </a:t>
+            </a:r>
+            <a:r>
+              <a:rPr lang="en-US" dirty="0" err="1" smtClean="0"/>
+              <a:t>setPointCloudRenderingProperties</a:t>
+            </a:r>
+            <a:r>
+              <a:rPr lang="en-US" dirty="0" smtClean="0"/>
+              <a:t>() does not find </a:t>
+            </a:r>
+            <a:r>
+              <a:rPr lang="en-US" dirty="0" err="1" smtClean="0"/>
+              <a:t>Pointclouds</a:t>
+            </a:r>
+            <a:r>
+              <a:rPr lang="en-US" dirty="0" smtClean="0"/>
+              <a:t> anymore</a:t>
+            </a:r>
+            <a:endParaRPr lang="de-DE" b="1" dirty="0" smtClean="0"/>
+          </a:p>
+        </p:txBody>
+      </p:sp>
+    </p:spTree>
+    <p:extLst>
+      <p:ext uri="{BB962C8B-B14F-4D97-AF65-F5344CB8AC3E}">
+        <p14:creationId xmlns:p14="http://schemas.microsoft.com/office/powerpoint/2010/main" val="1291883423"/>
+      </p:ext>
+    </p:extLst>
+  </p:cSld>
+  <p:clrMapOvr>
+    <a:masterClrMapping/>
+  </p:clrMapOvr>
+  <mc:AlternateContent xmlns:mc="http://schemas.openxmlformats.org/markup-compatibility/2006">
+    <mc:Choice xmlns:p14="http://schemas.microsoft.com/office/powerpoint/2010/main" Requires="p14">
+      <p:transition spd="med" p14:dur="700">
+        <p:fade/>
+      </p:transition>
+    </mc:Choice>
+    <mc:Fallback>
+      <p:transition spd="med">
+        <p:fade/>
+      </p:transition>
+    </mc:Fallback>
+  </mc:AlternateContent>
+  <p:timing>
+    <p:tnLst>
+      <p:par>
+        <p:cTn id="1" dur="indefinite" restart="never" nodeType="tmRoot"/>
       </p:par>
     </p:tnLst>
   </p:timing>

</xml_diff>